<commit_message>
Added class06 (B-epsilon trees, power of two choices).
</commit_message>
<xml_diff>
--- a/talks/src/class05.pptx
+++ b/talks/src/class05.pptx
@@ -6,10 +6,10 @@
     <p:sldMasterId id="2147483660" r:id="rId2"/>
   </p:sldMasterIdLst>
   <p:notesMasterIdLst>
-    <p:notesMasterId r:id="rId26"/>
+    <p:notesMasterId r:id="rId25"/>
   </p:notesMasterIdLst>
   <p:handoutMasterIdLst>
-    <p:handoutMasterId r:id="rId27"/>
+    <p:handoutMasterId r:id="rId26"/>
   </p:handoutMasterIdLst>
   <p:sldIdLst>
     <p:sldId id="280" r:id="rId3"/>
@@ -32,9 +32,8 @@
     <p:sldId id="381" r:id="rId20"/>
     <p:sldId id="382" r:id="rId21"/>
     <p:sldId id="383" r:id="rId22"/>
-    <p:sldId id="378" r:id="rId23"/>
-    <p:sldId id="366" r:id="rId24"/>
-    <p:sldId id="384" r:id="rId25"/>
+    <p:sldId id="366" r:id="rId23"/>
+    <p:sldId id="384" r:id="rId24"/>
   </p:sldIdLst>
   <p:sldSz cx="12192000" cy="6858000"/>
   <p:notesSz cx="6858000" cy="9144000"/>
@@ -226,7 +225,7 @@
           <a:p>
             <a:fld id="{56C6788E-680A-49E5-BB93-D456A9D23A29}" type="datetimeFigureOut">
               <a:rPr lang="ru-RU" smtClean="0"/>
-              <a:t>29.10.2018</a:t>
+              <a:t>04.11.2018</a:t>
             </a:fld>
             <a:endParaRPr lang="ru-RU"/>
           </a:p>
@@ -395,7 +394,7 @@
           <a:p>
             <a:fld id="{C4DF4945-C160-4CD5-B124-49B9BE14C0AB}" type="datetimeFigureOut">
               <a:rPr lang="ru-RU" smtClean="0"/>
-              <a:t>29.10.2018</a:t>
+              <a:t>04.11.2018</a:t>
             </a:fld>
             <a:endParaRPr lang="ru-RU"/>
           </a:p>
@@ -2138,7 +2137,7 @@
     </p:spTree>
     <p:extLst>
       <p:ext uri="{BB962C8B-B14F-4D97-AF65-F5344CB8AC3E}">
-        <p14:creationId xmlns:p14="http://schemas.microsoft.com/office/powerpoint/2010/main" val="1813754003"/>
+        <p14:creationId xmlns:p14="http://schemas.microsoft.com/office/powerpoint/2010/main" val="2523101175"/>
       </p:ext>
     </p:extLst>
   </p:cSld>
@@ -2214,112 +2213,6 @@
             <a:fld id="{7F33120B-582B-4354-977D-A474A534F6B9}" type="slidenum">
               <a:rPr lang="ru-RU" smtClean="0"/>
               <a:t>22</a:t>
-            </a:fld>
-            <a:endParaRPr lang="ru-RU"/>
-          </a:p>
-        </p:txBody>
-      </p:sp>
-      <p:sp>
-        <p:nvSpPr>
-          <p:cNvPr id="5" name="Header Placeholder 4"/>
-          <p:cNvSpPr>
-            <a:spLocks noGrp="1"/>
-          </p:cNvSpPr>
-          <p:nvPr>
-            <p:ph type="hdr" sz="quarter" idx="11"/>
-          </p:nvPr>
-        </p:nvSpPr>
-        <p:spPr/>
-        <p:txBody>
-          <a:bodyPr/>
-          <a:lstStyle/>
-          <a:p>
-            <a:r>
-              <a:rPr lang="ru-RU"/>
-              <a:t>Основы построения файловых систем</a:t>
-            </a:r>
-          </a:p>
-        </p:txBody>
-      </p:sp>
-    </p:spTree>
-    <p:extLst>
-      <p:ext uri="{BB962C8B-B14F-4D97-AF65-F5344CB8AC3E}">
-        <p14:creationId xmlns:p14="http://schemas.microsoft.com/office/powerpoint/2010/main" val="2523101175"/>
-      </p:ext>
-    </p:extLst>
-  </p:cSld>
-  <p:clrMapOvr>
-    <a:masterClrMapping/>
-  </p:clrMapOvr>
-</p:notes>
-</file>
-
-<file path=ppt/notesSlides/notesSlide23.xml><?xml version="1.0" encoding="utf-8"?>
-<p:notes xmlns:a="http://schemas.openxmlformats.org/drawingml/2006/main" xmlns:r="http://schemas.openxmlformats.org/officeDocument/2006/relationships" xmlns:p="http://schemas.openxmlformats.org/presentationml/2006/main">
-  <p:cSld>
-    <p:spTree>
-      <p:nvGrpSpPr>
-        <p:cNvPr id="1" name=""/>
-        <p:cNvGrpSpPr/>
-        <p:nvPr/>
-      </p:nvGrpSpPr>
-      <p:grpSpPr>
-        <a:xfrm>
-          <a:off x="0" y="0"/>
-          <a:ext cx="0" cy="0"/>
-          <a:chOff x="0" y="0"/>
-          <a:chExt cx="0" cy="0"/>
-        </a:xfrm>
-      </p:grpSpPr>
-      <p:sp>
-        <p:nvSpPr>
-          <p:cNvPr id="2" name="Slide Image Placeholder 1"/>
-          <p:cNvSpPr>
-            <a:spLocks noGrp="1" noRot="1" noChangeAspect="1"/>
-          </p:cNvSpPr>
-          <p:nvPr>
-            <p:ph type="sldImg"/>
-          </p:nvPr>
-        </p:nvSpPr>
-        <p:spPr/>
-      </p:sp>
-      <p:sp>
-        <p:nvSpPr>
-          <p:cNvPr id="3" name="Notes Placeholder 2"/>
-          <p:cNvSpPr>
-            <a:spLocks noGrp="1"/>
-          </p:cNvSpPr>
-          <p:nvPr>
-            <p:ph type="body" idx="1"/>
-          </p:nvPr>
-        </p:nvSpPr>
-        <p:spPr/>
-        <p:txBody>
-          <a:bodyPr/>
-          <a:lstStyle/>
-          <a:p>
-            <a:endParaRPr lang="ru-RU"/>
-          </a:p>
-        </p:txBody>
-      </p:sp>
-      <p:sp>
-        <p:nvSpPr>
-          <p:cNvPr id="4" name="Slide Number Placeholder 3"/>
-          <p:cNvSpPr>
-            <a:spLocks noGrp="1"/>
-          </p:cNvSpPr>
-          <p:nvPr>
-            <p:ph type="sldNum" sz="quarter" idx="10"/>
-          </p:nvPr>
-        </p:nvSpPr>
-        <p:spPr/>
-        <p:txBody>
-          <a:bodyPr/>
-          <a:lstStyle/>
-          <a:p>
-            <a:fld id="{7F33120B-582B-4354-977D-A474A534F6B9}" type="slidenum">
-              <a:rPr lang="ru-RU" smtClean="0"/>
-              <a:t>23</a:t>
             </a:fld>
             <a:endParaRPr lang="ru-RU"/>
           </a:p>
@@ -3233,7 +3126,7 @@
           <a:p>
             <a:fld id="{12C63722-5D9F-4E99-9720-9B6A0C7BB1C9}" type="datetimeFigureOut">
               <a:rPr lang="ru-RU" smtClean="0"/>
-              <a:t>29.10.2018</a:t>
+              <a:t>04.11.2018</a:t>
             </a:fld>
             <a:endParaRPr lang="ru-RU"/>
           </a:p>
@@ -3403,7 +3296,7 @@
           <a:p>
             <a:fld id="{12C63722-5D9F-4E99-9720-9B6A0C7BB1C9}" type="datetimeFigureOut">
               <a:rPr lang="ru-RU" smtClean="0"/>
-              <a:t>29.10.2018</a:t>
+              <a:t>04.11.2018</a:t>
             </a:fld>
             <a:endParaRPr lang="ru-RU"/>
           </a:p>
@@ -3583,7 +3476,7 @@
           <a:p>
             <a:fld id="{12C63722-5D9F-4E99-9720-9B6A0C7BB1C9}" type="datetimeFigureOut">
               <a:rPr lang="ru-RU" smtClean="0"/>
-              <a:t>29.10.2018</a:t>
+              <a:t>04.11.2018</a:t>
             </a:fld>
             <a:endParaRPr lang="ru-RU"/>
           </a:p>
@@ -3775,7 +3668,7 @@
           <a:p>
             <a:fld id="{8C218C88-2408-4CFC-B25C-07450930B282}" type="datetimeFigureOut">
               <a:rPr lang="ru-RU" smtClean="0"/>
-              <a:t>29.10.2018</a:t>
+              <a:t>04.11.2018</a:t>
             </a:fld>
             <a:endParaRPr lang="ru-RU"/>
           </a:p>
@@ -3945,7 +3838,7 @@
           <a:p>
             <a:fld id="{8C218C88-2408-4CFC-B25C-07450930B282}" type="datetimeFigureOut">
               <a:rPr lang="ru-RU" smtClean="0"/>
-              <a:t>29.10.2018</a:t>
+              <a:t>04.11.2018</a:t>
             </a:fld>
             <a:endParaRPr lang="ru-RU"/>
           </a:p>
@@ -4191,7 +4084,7 @@
           <a:p>
             <a:fld id="{8C218C88-2408-4CFC-B25C-07450930B282}" type="datetimeFigureOut">
               <a:rPr lang="ru-RU" smtClean="0"/>
-              <a:t>29.10.2018</a:t>
+              <a:t>04.11.2018</a:t>
             </a:fld>
             <a:endParaRPr lang="ru-RU"/>
           </a:p>
@@ -4423,7 +4316,7 @@
           <a:p>
             <a:fld id="{8C218C88-2408-4CFC-B25C-07450930B282}" type="datetimeFigureOut">
               <a:rPr lang="ru-RU" smtClean="0"/>
-              <a:t>29.10.2018</a:t>
+              <a:t>04.11.2018</a:t>
             </a:fld>
             <a:endParaRPr lang="ru-RU"/>
           </a:p>
@@ -4790,7 +4683,7 @@
           <a:p>
             <a:fld id="{8C218C88-2408-4CFC-B25C-07450930B282}" type="datetimeFigureOut">
               <a:rPr lang="ru-RU" smtClean="0"/>
-              <a:t>29.10.2018</a:t>
+              <a:t>04.11.2018</a:t>
             </a:fld>
             <a:endParaRPr lang="ru-RU"/>
           </a:p>
@@ -4908,7 +4801,7 @@
           <a:p>
             <a:fld id="{8C218C88-2408-4CFC-B25C-07450930B282}" type="datetimeFigureOut">
               <a:rPr lang="ru-RU" smtClean="0"/>
-              <a:t>29.10.2018</a:t>
+              <a:t>04.11.2018</a:t>
             </a:fld>
             <a:endParaRPr lang="ru-RU"/>
           </a:p>
@@ -5003,7 +4896,7 @@
           <a:p>
             <a:fld id="{8C218C88-2408-4CFC-B25C-07450930B282}" type="datetimeFigureOut">
               <a:rPr lang="ru-RU" smtClean="0"/>
-              <a:t>29.10.2018</a:t>
+              <a:t>04.11.2018</a:t>
             </a:fld>
             <a:endParaRPr lang="ru-RU"/>
           </a:p>
@@ -5280,7 +5173,7 @@
           <a:p>
             <a:fld id="{8C218C88-2408-4CFC-B25C-07450930B282}" type="datetimeFigureOut">
               <a:rPr lang="ru-RU" smtClean="0"/>
-              <a:t>29.10.2018</a:t>
+              <a:t>04.11.2018</a:t>
             </a:fld>
             <a:endParaRPr lang="ru-RU"/>
           </a:p>
@@ -5450,7 +5343,7 @@
           <a:p>
             <a:fld id="{12C63722-5D9F-4E99-9720-9B6A0C7BB1C9}" type="datetimeFigureOut">
               <a:rPr lang="ru-RU" smtClean="0"/>
-              <a:t>29.10.2018</a:t>
+              <a:t>04.11.2018</a:t>
             </a:fld>
             <a:endParaRPr lang="ru-RU"/>
           </a:p>
@@ -5703,7 +5596,7 @@
           <a:p>
             <a:fld id="{8C218C88-2408-4CFC-B25C-07450930B282}" type="datetimeFigureOut">
               <a:rPr lang="ru-RU" smtClean="0"/>
-              <a:t>29.10.2018</a:t>
+              <a:t>04.11.2018</a:t>
             </a:fld>
             <a:endParaRPr lang="ru-RU"/>
           </a:p>
@@ -5873,7 +5766,7 @@
           <a:p>
             <a:fld id="{8C218C88-2408-4CFC-B25C-07450930B282}" type="datetimeFigureOut">
               <a:rPr lang="ru-RU" smtClean="0"/>
-              <a:t>29.10.2018</a:t>
+              <a:t>04.11.2018</a:t>
             </a:fld>
             <a:endParaRPr lang="ru-RU"/>
           </a:p>
@@ -6053,7 +5946,7 @@
           <a:p>
             <a:fld id="{8C218C88-2408-4CFC-B25C-07450930B282}" type="datetimeFigureOut">
               <a:rPr lang="ru-RU" smtClean="0"/>
-              <a:t>29.10.2018</a:t>
+              <a:t>04.11.2018</a:t>
             </a:fld>
             <a:endParaRPr lang="ru-RU"/>
           </a:p>
@@ -6299,7 +6192,7 @@
           <a:p>
             <a:fld id="{12C63722-5D9F-4E99-9720-9B6A0C7BB1C9}" type="datetimeFigureOut">
               <a:rPr lang="ru-RU" smtClean="0"/>
-              <a:t>29.10.2018</a:t>
+              <a:t>04.11.2018</a:t>
             </a:fld>
             <a:endParaRPr lang="ru-RU"/>
           </a:p>
@@ -6539,7 +6432,7 @@
           <a:p>
             <a:fld id="{12C63722-5D9F-4E99-9720-9B6A0C7BB1C9}" type="datetimeFigureOut">
               <a:rPr lang="ru-RU" smtClean="0"/>
-              <a:t>29.10.2018</a:t>
+              <a:t>04.11.2018</a:t>
             </a:fld>
             <a:endParaRPr lang="ru-RU"/>
           </a:p>
@@ -6906,7 +6799,7 @@
           <a:p>
             <a:fld id="{12C63722-5D9F-4E99-9720-9B6A0C7BB1C9}" type="datetimeFigureOut">
               <a:rPr lang="ru-RU" smtClean="0"/>
-              <a:t>29.10.2018</a:t>
+              <a:t>04.11.2018</a:t>
             </a:fld>
             <a:endParaRPr lang="ru-RU"/>
           </a:p>
@@ -7024,7 +6917,7 @@
           <a:p>
             <a:fld id="{12C63722-5D9F-4E99-9720-9B6A0C7BB1C9}" type="datetimeFigureOut">
               <a:rPr lang="ru-RU" smtClean="0"/>
-              <a:t>29.10.2018</a:t>
+              <a:t>04.11.2018</a:t>
             </a:fld>
             <a:endParaRPr lang="ru-RU"/>
           </a:p>
@@ -7119,7 +7012,7 @@
           <a:p>
             <a:fld id="{12C63722-5D9F-4E99-9720-9B6A0C7BB1C9}" type="datetimeFigureOut">
               <a:rPr lang="ru-RU" smtClean="0"/>
-              <a:t>29.10.2018</a:t>
+              <a:t>04.11.2018</a:t>
             </a:fld>
             <a:endParaRPr lang="ru-RU"/>
           </a:p>
@@ -7396,7 +7289,7 @@
           <a:p>
             <a:fld id="{12C63722-5D9F-4E99-9720-9B6A0C7BB1C9}" type="datetimeFigureOut">
               <a:rPr lang="ru-RU" smtClean="0"/>
-              <a:t>29.10.2018</a:t>
+              <a:t>04.11.2018</a:t>
             </a:fld>
             <a:endParaRPr lang="ru-RU"/>
           </a:p>
@@ -7649,7 +7542,7 @@
           <a:p>
             <a:fld id="{12C63722-5D9F-4E99-9720-9B6A0C7BB1C9}" type="datetimeFigureOut">
               <a:rPr lang="ru-RU" smtClean="0"/>
-              <a:t>29.10.2018</a:t>
+              <a:t>04.11.2018</a:t>
             </a:fld>
             <a:endParaRPr lang="ru-RU"/>
           </a:p>
@@ -7862,7 +7755,7 @@
           <a:p>
             <a:fld id="{12C63722-5D9F-4E99-9720-9B6A0C7BB1C9}" type="datetimeFigureOut">
               <a:rPr lang="ru-RU" smtClean="0"/>
-              <a:t>29.10.2018</a:t>
+              <a:t>04.11.2018</a:t>
             </a:fld>
             <a:endParaRPr lang="ru-RU"/>
           </a:p>
@@ -8402,7 +8295,7 @@
           <a:p>
             <a:fld id="{8C218C88-2408-4CFC-B25C-07450930B282}" type="datetimeFigureOut">
               <a:rPr lang="ru-RU" smtClean="0"/>
-              <a:t>29.10.2018</a:t>
+              <a:t>04.11.2018</a:t>
             </a:fld>
             <a:endParaRPr lang="ru-RU"/>
           </a:p>
@@ -22942,727 +22835,6 @@
           </a:graphicData>
         </a:graphic>
       </p:graphicFrame>
-      <mc:AlternateContent xmlns:mc="http://schemas.openxmlformats.org/markup-compatibility/2006" xmlns:a14="http://schemas.microsoft.com/office/drawing/2010/main">
-        <mc:Choice Requires="a14">
-          <p:graphicFrame>
-            <p:nvGraphicFramePr>
-              <p:cNvPr id="2" name="Table 1"/>
-              <p:cNvGraphicFramePr>
-                <a:graphicFrameLocks noGrp="1"/>
-              </p:cNvGraphicFramePr>
-              <p:nvPr>
-                <p:extLst>
-                  <p:ext uri="{D42A27DB-BD31-4B8C-83A1-F6EECF244321}">
-                    <p14:modId xmlns:p14="http://schemas.microsoft.com/office/powerpoint/2010/main" val="700506552"/>
-                  </p:ext>
-                </p:extLst>
-              </p:nvPr>
-            </p:nvGraphicFramePr>
-            <p:xfrm>
-              <a:off x="0" y="365761"/>
-              <a:ext cx="12192000" cy="5486400"/>
-            </p:xfrm>
-            <a:graphic>
-              <a:graphicData uri="http://schemas.openxmlformats.org/drawingml/2006/table">
-                <a:tbl>
-                  <a:tblPr firstRow="1" bandRow="1">
-                    <a:tableStyleId>{3B4B98B0-60AC-42C2-AFA5-B58CD77FA1E5}</a:tableStyleId>
-                  </a:tblPr>
-                  <a:tblGrid>
-                    <a:gridCol w="12192000">
-                      <a:extLst>
-                        <a:ext uri="{9D8B030D-6E8A-4147-A177-3AD203B41FA5}">
-                          <a16:colId xmlns:a16="http://schemas.microsoft.com/office/drawing/2014/main" val="20000"/>
-                        </a:ext>
-                      </a:extLst>
-                    </a:gridCol>
-                  </a:tblGrid>
-                  <a:tr h="370840">
-                    <a:tc>
-                      <a:txBody>
-                        <a:bodyPr/>
-                        <a:lstStyle/>
-                        <a:p>
-                          <a14:m>
-                            <m:oMath xmlns:m="http://schemas.openxmlformats.org/officeDocument/2006/math">
-                              <m:sSup>
-                                <m:sSupPr>
-                                  <m:ctrlPr>
-                                    <a:rPr lang="en-US" sz="2400" b="1" i="1" smtClean="0">
-                                      <a:latin typeface="Cambria Math" panose="02040503050406030204" pitchFamily="18" charset="0"/>
-                                    </a:rPr>
-                                  </m:ctrlPr>
-                                </m:sSupPr>
-                                <m:e>
-                                  <m:r>
-                                    <a:rPr lang="en-US" sz="2400" b="1" i="1" smtClean="0">
-                                      <a:latin typeface="Cambria Math" charset="0"/>
-                                    </a:rPr>
-                                    <m:t>𝑩</m:t>
-                                  </m:r>
-                                </m:e>
-                                <m:sup>
-                                  <m:r>
-                                    <a:rPr lang="en-US" sz="2400" b="1" i="1" smtClean="0">
-                                      <a:latin typeface="Cambria Math" charset="0"/>
-                                    </a:rPr>
-                                    <m:t>𝝐</m:t>
-                                  </m:r>
-                                </m:sup>
-                              </m:sSup>
-                            </m:oMath>
-                          </a14:m>
-                          <a:r>
-                            <a:rPr lang="en-US" sz="2400" dirty="0"/>
-                            <a:t>-</a:t>
-                          </a:r>
-                          <a:r>
-                            <a:rPr lang="ru-RU" sz="2400" dirty="0"/>
-                            <a:t>деревья</a:t>
-                          </a:r>
-                          <a:endParaRPr lang="en-US" sz="2400" dirty="0"/>
-                        </a:p>
-                      </a:txBody>
-                      <a:tcPr/>
-                    </a:tc>
-                    <a:extLst>
-                      <a:ext uri="{0D108BD9-81ED-4DB2-BD59-A6C34878D82A}">
-                        <a16:rowId xmlns:a16="http://schemas.microsoft.com/office/drawing/2014/main" val="10000"/>
-                      </a:ext>
-                    </a:extLst>
-                  </a:tr>
-                  <a:tr h="370840">
-                    <a:tc>
-                      <a:txBody>
-                        <a:bodyPr/>
-                        <a:lstStyle/>
-                        <a:p>
-                          <a:pPr marL="0" indent="0">
-                            <a:buFont typeface="Arial" charset="0"/>
-                            <a:buNone/>
-                          </a:pPr>
-                          <a:r>
-                            <a:rPr lang="ru-RU" dirty="0"/>
-                            <a:t>Как</a:t>
-                          </a:r>
-                          <a:r>
-                            <a:rPr lang="ru-RU" baseline="0" dirty="0"/>
-                            <a:t> и в </a:t>
-                          </a:r>
-                          <a:r>
-                            <a:rPr lang="en-US" baseline="0" dirty="0"/>
-                            <a:t>B-</a:t>
-                          </a:r>
-                          <a:r>
-                            <a:rPr lang="ru-RU" baseline="0" dirty="0"/>
-                            <a:t>деревьях, узлы являются достаточно длинными блоками, но теперь они разделяются на две части:</a:t>
-                          </a:r>
-                        </a:p>
-                        <a:p>
-                          <a:pPr marL="285750" indent="-285750">
-                            <a:buFont typeface="Arial" charset="0"/>
-                            <a:buChar char="•"/>
-                          </a:pPr>
-                          <a:r>
-                            <a:rPr lang="en-US" baseline="0" dirty="0"/>
-                            <a:t>pivots (</a:t>
-                          </a:r>
-                          <a:r>
-                            <a:rPr lang="ru-RU" baseline="0" dirty="0"/>
-                            <a:t>пары ключ-значение с указателями на пользовательские данные или на другие узлы дерева),</a:t>
-                          </a:r>
-                        </a:p>
-                        <a:p>
-                          <a:pPr marL="285750" indent="-285750">
-                            <a:buFont typeface="Arial" charset="0"/>
-                            <a:buChar char="•"/>
-                          </a:pPr>
-                          <a:r>
-                            <a:rPr lang="en-US" baseline="0" dirty="0"/>
-                            <a:t>commands (</a:t>
-                          </a:r>
-                          <a:r>
-                            <a:rPr lang="ru-RU" baseline="0" dirty="0"/>
-                            <a:t>журнал вставок и удалений).</a:t>
-                          </a:r>
-                        </a:p>
-                        <a:p>
-                          <a:pPr marL="0" indent="0">
-                            <a:buFont typeface="Arial" charset="0"/>
-                            <a:buNone/>
-                          </a:pPr>
-                          <a:r>
-                            <a:rPr lang="ru-RU" baseline="0" dirty="0"/>
-                            <a:t>Узлы длиной </a:t>
-                          </a:r>
-                          <a:r>
-                            <a:rPr lang="en-US" baseline="0" dirty="0"/>
-                            <a:t>B </a:t>
-                          </a:r>
-                          <a:r>
-                            <a:rPr lang="ru-RU" baseline="0" dirty="0"/>
-                            <a:t>байт делятся в пропорции </a:t>
-                          </a:r>
-                          <a14:m>
-                            <m:oMath xmlns:m="http://schemas.openxmlformats.org/officeDocument/2006/math">
-                              <m:sSup>
-                                <m:sSupPr>
-                                  <m:ctrlPr>
-                                    <a:rPr lang="en-US" b="0" i="1" baseline="0" smtClean="0">
-                                      <a:latin typeface="Cambria Math" panose="02040503050406030204" pitchFamily="18" charset="0"/>
-                                    </a:rPr>
-                                  </m:ctrlPr>
-                                </m:sSupPr>
-                                <m:e>
-                                  <m:r>
-                                    <a:rPr lang="en-US" b="0" i="1" baseline="0" smtClean="0">
-                                      <a:latin typeface="Cambria Math" charset="0"/>
-                                    </a:rPr>
-                                    <m:t>𝐵</m:t>
-                                  </m:r>
-                                </m:e>
-                                <m:sup>
-                                  <m:r>
-                                    <a:rPr lang="en-US" b="0" i="1" baseline="0" smtClean="0">
-                                      <a:latin typeface="Cambria Math" charset="0"/>
-                                    </a:rPr>
-                                    <m:t>𝜖</m:t>
-                                  </m:r>
-                                </m:sup>
-                              </m:sSup>
-                            </m:oMath>
-                          </a14:m>
-                          <a:r>
-                            <a:rPr lang="en-US" dirty="0"/>
-                            <a:t> </a:t>
-                          </a:r>
-                          <a:r>
-                            <a:rPr lang="ru-RU" dirty="0"/>
-                            <a:t>байт на </a:t>
-                          </a:r>
-                          <a:r>
-                            <a:rPr lang="en-US" dirty="0"/>
-                            <a:t>pivots</a:t>
-                          </a:r>
-                          <a:r>
-                            <a:rPr lang="en-US" baseline="0" dirty="0"/>
-                            <a:t> </a:t>
-                          </a:r>
-                          <a:r>
-                            <a:rPr lang="ru-RU" baseline="0" dirty="0"/>
-                            <a:t>и </a:t>
-                          </a:r>
-                          <a14:m>
-                            <m:oMath xmlns:m="http://schemas.openxmlformats.org/officeDocument/2006/math">
-                              <m:r>
-                                <a:rPr lang="en-US" b="0" i="1" baseline="0" smtClean="0">
-                                  <a:latin typeface="Cambria Math" charset="0"/>
-                                </a:rPr>
-                                <m:t>𝐵</m:t>
-                              </m:r>
-                              <m:r>
-                                <a:rPr lang="en-US" b="0" i="1" baseline="0" smtClean="0">
-                                  <a:latin typeface="Cambria Math" charset="0"/>
-                                </a:rPr>
-                                <m:t> −</m:t>
-                              </m:r>
-                              <m:sSup>
-                                <m:sSupPr>
-                                  <m:ctrlPr>
-                                    <a:rPr lang="en-US" b="0" i="1" baseline="0" smtClean="0">
-                                      <a:latin typeface="Cambria Math" panose="02040503050406030204" pitchFamily="18" charset="0"/>
-                                    </a:rPr>
-                                  </m:ctrlPr>
-                                </m:sSupPr>
-                                <m:e>
-                                  <m:r>
-                                    <a:rPr lang="en-US" b="0" i="1" baseline="0" smtClean="0">
-                                      <a:latin typeface="Cambria Math" charset="0"/>
-                                    </a:rPr>
-                                    <m:t>𝐵</m:t>
-                                  </m:r>
-                                </m:e>
-                                <m:sup>
-                                  <m:r>
-                                    <a:rPr lang="en-US" b="0" i="1" baseline="0" smtClean="0">
-                                      <a:latin typeface="Cambria Math" charset="0"/>
-                                    </a:rPr>
-                                    <m:t>𝜖</m:t>
-                                  </m:r>
-                                </m:sup>
-                              </m:sSup>
-                            </m:oMath>
-                          </a14:m>
-                          <a:r>
-                            <a:rPr lang="en-US" dirty="0"/>
-                            <a:t> </a:t>
-                          </a:r>
-                          <a:r>
-                            <a:rPr lang="ru-RU" dirty="0"/>
-                            <a:t>байт на </a:t>
-                          </a:r>
-                          <a:r>
-                            <a:rPr lang="en-US" dirty="0"/>
-                            <a:t>commands.</a:t>
-                          </a:r>
-                        </a:p>
-                        <a:p>
-                          <a:pPr marL="0" indent="0">
-                            <a:buFont typeface="Arial" charset="0"/>
-                            <a:buNone/>
-                          </a:pPr>
-                          <a:endParaRPr lang="en-US" dirty="0"/>
-                        </a:p>
-                        <a:p>
-                          <a:pPr marL="285750" indent="-285750">
-                            <a:buFont typeface="Arial" charset="0"/>
-                            <a:buChar char="•"/>
-                          </a:pPr>
-                          <a:r>
-                            <a:rPr lang="ru-RU" dirty="0"/>
-                            <a:t>Вставки</a:t>
-                          </a:r>
-                          <a:r>
-                            <a:rPr lang="ru-RU" baseline="0" dirty="0"/>
-                            <a:t> и удаления добавляются только в журнал корневого узла,</a:t>
-                          </a:r>
-                        </a:p>
-                        <a:p>
-                          <a:pPr marL="285750" indent="-285750">
-                            <a:buFont typeface="Arial" charset="0"/>
-                            <a:buChar char="•"/>
-                          </a:pPr>
-                          <a:r>
-                            <a:rPr lang="ru-RU" baseline="0" dirty="0"/>
-                            <a:t>При переполнении журнала в корне он выталкивается в журналы дочерних узлов, причём выталкиваются только модификации наиболее изменённых поддеревьев.</a:t>
-                          </a:r>
-                        </a:p>
-                        <a:p>
-                          <a:pPr marL="0" indent="0">
-                            <a:buFont typeface="Arial" charset="0"/>
-                            <a:buNone/>
-                          </a:pPr>
-                          <a:endParaRPr lang="ru-RU" baseline="0" dirty="0"/>
-                        </a:p>
-                        <a:p>
-                          <a:pPr marL="0" indent="0">
-                            <a:buFont typeface="Arial" charset="0"/>
-                            <a:buNone/>
-                          </a:pPr>
-                          <a:r>
-                            <a:rPr lang="ru-RU" dirty="0"/>
-                            <a:t>Преимущества такой реализации:</a:t>
-                          </a:r>
-                        </a:p>
-                        <a:p>
-                          <a:pPr marL="285750" indent="-285750">
-                            <a:buFont typeface="Arial" charset="0"/>
-                            <a:buChar char="•"/>
-                          </a:pPr>
-                          <a:r>
-                            <a:rPr lang="ru-RU" dirty="0"/>
-                            <a:t>Нет</a:t>
-                          </a:r>
-                          <a:r>
-                            <a:rPr lang="ru-RU" baseline="0" dirty="0"/>
-                            <a:t> необходимости поиска во многих деревьях или построения фильтров </a:t>
-                          </a:r>
-                          <a:r>
-                            <a:rPr lang="ru-RU" baseline="0" dirty="0" err="1"/>
-                            <a:t>Блума</a:t>
-                          </a:r>
-                          <a:r>
-                            <a:rPr lang="ru-RU" baseline="0" dirty="0"/>
-                            <a:t>,</a:t>
-                          </a:r>
-                        </a:p>
-                        <a:p>
-                          <a:pPr marL="285750" indent="-285750">
-                            <a:buFont typeface="Arial" charset="0"/>
-                            <a:buChar char="•"/>
-                          </a:pPr>
-                          <a:r>
-                            <a:rPr lang="ru-RU" baseline="0" dirty="0"/>
-                            <a:t>Журнал изменений расположен в корневом узле, который всегда в </a:t>
-                          </a:r>
-                          <a:r>
-                            <a:rPr lang="ru-RU" baseline="0" dirty="0" err="1"/>
-                            <a:t>кеше</a:t>
-                          </a:r>
-                          <a:r>
-                            <a:rPr lang="ru-RU" baseline="0" dirty="0"/>
-                            <a:t>,</a:t>
-                          </a:r>
-                        </a:p>
-                        <a:p>
-                          <a:pPr marL="285750" indent="-285750">
-                            <a:buFont typeface="Arial" charset="0"/>
-                            <a:buChar char="•"/>
-                          </a:pPr>
-                          <a:r>
-                            <a:rPr lang="ru-RU" baseline="0" dirty="0"/>
-                            <a:t>При расщеплении журнала изменений генерируется меньше </a:t>
-                          </a:r>
-                          <a:r>
-                            <a:rPr lang="en-US" baseline="0" dirty="0"/>
-                            <a:t>IO, </a:t>
-                          </a:r>
-                          <a:r>
-                            <a:rPr lang="ru-RU" baseline="0" dirty="0"/>
-                            <a:t>чем при слиянии компонент </a:t>
-                          </a:r>
-                          <a:r>
-                            <a:rPr lang="en-US" baseline="0" dirty="0"/>
-                            <a:t>LSM-</a:t>
-                          </a:r>
-                          <a:r>
-                            <a:rPr lang="ru-RU" baseline="0" dirty="0"/>
-                            <a:t>дерева,</a:t>
-                          </a:r>
-                        </a:p>
-                        <a:p>
-                          <a:pPr marL="285750" indent="-285750">
-                            <a:buFont typeface="Arial" charset="0"/>
-                            <a:buChar char="•"/>
-                          </a:pPr>
-                          <a:r>
-                            <a:rPr lang="ru-RU" baseline="0" dirty="0"/>
-                            <a:t>Если записи журнала поддерживать упорядоченными, то можно реализовать </a:t>
-                          </a:r>
-                          <a:r>
-                            <a:rPr lang="en-US" baseline="0" dirty="0"/>
-                            <a:t>range queries, -- </a:t>
-                          </a:r>
-                          <a:r>
-                            <a:rPr lang="ru-RU" baseline="0" dirty="0"/>
-                            <a:t>запросы диапазонов ключей</a:t>
-                          </a:r>
-                        </a:p>
-                        <a:p>
-                          <a:pPr marL="285750" indent="-285750">
-                            <a:buFont typeface="Arial" charset="0"/>
-                            <a:buChar char="•"/>
-                          </a:pPr>
-                          <a:r>
-                            <a:rPr lang="ru-RU" baseline="0" dirty="0"/>
-                            <a:t>Размер узлов </a:t>
-                          </a:r>
-                          <a14:m>
-                            <m:oMath xmlns:m="http://schemas.openxmlformats.org/officeDocument/2006/math">
-                              <m:sSup>
-                                <m:sSupPr>
-                                  <m:ctrlPr>
-                                    <a:rPr lang="en-US" b="0" i="1" baseline="0" smtClean="0">
-                                      <a:latin typeface="Cambria Math" panose="02040503050406030204" pitchFamily="18" charset="0"/>
-                                    </a:rPr>
-                                  </m:ctrlPr>
-                                </m:sSupPr>
-                                <m:e>
-                                  <m:r>
-                                    <a:rPr lang="en-US" b="0" i="1" baseline="0" smtClean="0">
-                                      <a:latin typeface="Cambria Math" charset="0"/>
-                                    </a:rPr>
-                                    <m:t>𝐵</m:t>
-                                  </m:r>
-                                </m:e>
-                                <m:sup>
-                                  <m:r>
-                                    <a:rPr lang="en-US" b="0" i="1" baseline="0" smtClean="0">
-                                      <a:latin typeface="Cambria Math" charset="0"/>
-                                    </a:rPr>
-                                    <m:t>𝜖</m:t>
-                                  </m:r>
-                                </m:sup>
-                              </m:sSup>
-                            </m:oMath>
-                          </a14:m>
-                          <a:r>
-                            <a:rPr lang="en-US" dirty="0"/>
-                            <a:t>-</a:t>
-                          </a:r>
-                          <a:r>
-                            <a:rPr lang="ru-RU" dirty="0"/>
-                            <a:t>деревьев можно делать много</a:t>
-                          </a:r>
-                          <a:r>
-                            <a:rPr lang="ru-RU" baseline="0" dirty="0"/>
-                            <a:t> больше, чем у </a:t>
-                          </a:r>
-                          <a:r>
-                            <a:rPr lang="en-US" baseline="0" dirty="0"/>
-                            <a:t>B-</a:t>
-                          </a:r>
-                          <a:r>
-                            <a:rPr lang="ru-RU" baseline="0" dirty="0"/>
-                            <a:t>деревьев, что уменьшает их глубину.</a:t>
-                          </a:r>
-                          <a:endParaRPr lang="en-US" baseline="0" dirty="0"/>
-                        </a:p>
-                        <a:p>
-                          <a:pPr marL="285750" indent="-285750">
-                            <a:buFont typeface="Arial" charset="0"/>
-                            <a:buChar char="•"/>
-                          </a:pPr>
-                          <a:endParaRPr lang="en-US" baseline="0" dirty="0"/>
-                        </a:p>
-                        <a:p>
-                          <a:pPr marL="0" indent="0">
-                            <a:buFont typeface="Arial" charset="0"/>
-                            <a:buNone/>
-                          </a:pPr>
-                          <a:r>
-                            <a:rPr lang="en-US" dirty="0">
-                              <a:hlinkClick r:id="rId3"/>
-                            </a:rPr>
-                            <a:t>https://www.usenix.org</a:t>
-                          </a:r>
-                          <a:r>
-                            <a:rPr lang="en-US">
-                              <a:hlinkClick r:id="rId3"/>
-                            </a:rPr>
-                            <a:t>/system/files/login/articles/login_oct15_05_bender.pdf</a:t>
-                          </a:r>
-                          <a:endParaRPr lang="en-US" dirty="0"/>
-                        </a:p>
-                      </a:txBody>
-                      <a:tcPr/>
-                    </a:tc>
-                    <a:extLst>
-                      <a:ext uri="{0D108BD9-81ED-4DB2-BD59-A6C34878D82A}">
-                        <a16:rowId xmlns:a16="http://schemas.microsoft.com/office/drawing/2014/main" val="10001"/>
-                      </a:ext>
-                    </a:extLst>
-                  </a:tr>
-                </a:tbl>
-              </a:graphicData>
-            </a:graphic>
-          </p:graphicFrame>
-        </mc:Choice>
-        <mc:Fallback xmlns="">
-          <p:graphicFrame>
-            <p:nvGraphicFramePr>
-              <p:cNvPr id="2" name="Table 1"/>
-              <p:cNvGraphicFramePr>
-                <a:graphicFrameLocks noGrp="1"/>
-              </p:cNvGraphicFramePr>
-              <p:nvPr>
-                <p:extLst>
-                  <p:ext uri="{D42A27DB-BD31-4B8C-83A1-F6EECF244321}">
-                    <p14:modId xmlns:p14="http://schemas.microsoft.com/office/powerpoint/2010/main" val="700506552"/>
-                  </p:ext>
-                </p:extLst>
-              </p:nvPr>
-            </p:nvGraphicFramePr>
-            <p:xfrm>
-              <a:off x="0" y="365761"/>
-              <a:ext cx="12192000" cy="5486400"/>
-            </p:xfrm>
-            <a:graphic>
-              <a:graphicData uri="http://schemas.openxmlformats.org/drawingml/2006/table">
-                <a:tbl>
-                  <a:tblPr firstRow="1" bandRow="1">
-                    <a:tableStyleId>{3B4B98B0-60AC-42C2-AFA5-B58CD77FA1E5}</a:tableStyleId>
-                  </a:tblPr>
-                  <a:tblGrid>
-                    <a:gridCol w="12192000"/>
-                  </a:tblGrid>
-                  <a:tr h="457200">
-                    <a:tc>
-                      <a:txBody>
-                        <a:bodyPr/>
-                        <a:lstStyle/>
-                        <a:p>
-                          <a:endParaRPr lang="en-US"/>
-                        </a:p>
-                      </a:txBody>
-                      <a:tcPr>
-                        <a:blipFill rotWithShape="0">
-                          <a:blip r:embed="rId4"/>
-                          <a:stretch>
-                            <a:fillRect t="-10667" r="-100" b="-1121333"/>
-                          </a:stretch>
-                        </a:blipFill>
-                      </a:tcPr>
-                    </a:tc>
-                  </a:tr>
-                  <a:tr h="5029200">
-                    <a:tc>
-                      <a:txBody>
-                        <a:bodyPr/>
-                        <a:lstStyle/>
-                        <a:p>
-                          <a:endParaRPr lang="en-US"/>
-                        </a:p>
-                      </a:txBody>
-                      <a:tcPr>
-                        <a:blipFill rotWithShape="0">
-                          <a:blip r:embed="rId4"/>
-                          <a:stretch>
-                            <a:fillRect t="-10048" r="-100" b="-1816"/>
-                          </a:stretch>
-                        </a:blipFill>
-                      </a:tcPr>
-                    </a:tc>
-                  </a:tr>
-                </a:tbl>
-              </a:graphicData>
-            </a:graphic>
-          </p:graphicFrame>
-        </mc:Fallback>
-      </mc:AlternateContent>
-    </p:spTree>
-    <p:extLst>
-      <p:ext uri="{BB962C8B-B14F-4D97-AF65-F5344CB8AC3E}">
-        <p14:creationId xmlns:p14="http://schemas.microsoft.com/office/powerpoint/2010/main" val="15568470"/>
-      </p:ext>
-    </p:extLst>
-  </p:cSld>
-  <p:clrMapOvr>
-    <a:masterClrMapping/>
-  </p:clrMapOvr>
-</p:sld>
-</file>
-
-<file path=ppt/slides/slide22.xml><?xml version="1.0" encoding="utf-8"?>
-<p:sld xmlns:a="http://schemas.openxmlformats.org/drawingml/2006/main" xmlns:r="http://schemas.openxmlformats.org/officeDocument/2006/relationships" xmlns:p="http://schemas.openxmlformats.org/presentationml/2006/main">
-  <p:cSld>
-    <p:spTree>
-      <p:nvGrpSpPr>
-        <p:cNvPr id="1" name=""/>
-        <p:cNvGrpSpPr/>
-        <p:nvPr/>
-      </p:nvGrpSpPr>
-      <p:grpSpPr>
-        <a:xfrm>
-          <a:off x="0" y="0"/>
-          <a:ext cx="0" cy="0"/>
-          <a:chOff x="0" y="0"/>
-          <a:chExt cx="0" cy="0"/>
-        </a:xfrm>
-      </p:grpSpPr>
-      <p:graphicFrame>
-        <p:nvGraphicFramePr>
-          <p:cNvPr id="5" name="Table 4"/>
-          <p:cNvGraphicFramePr>
-            <a:graphicFrameLocks noGrp="1"/>
-          </p:cNvGraphicFramePr>
-          <p:nvPr>
-            <p:extLst>
-              <p:ext uri="{D42A27DB-BD31-4B8C-83A1-F6EECF244321}">
-                <p14:modId xmlns:p14="http://schemas.microsoft.com/office/powerpoint/2010/main" val="2281224332"/>
-              </p:ext>
-            </p:extLst>
-          </p:nvPr>
-        </p:nvGraphicFramePr>
-        <p:xfrm>
-          <a:off x="0" y="1"/>
-          <a:ext cx="12192000" cy="365760"/>
-        </p:xfrm>
-        <a:graphic>
-          <a:graphicData uri="http://schemas.openxmlformats.org/drawingml/2006/table">
-            <a:tbl>
-              <a:tblPr firstRow="1" bandRow="1">
-                <a:tableStyleId>{5C22544A-7EE6-4342-B048-85BDC9FD1C3A}</a:tableStyleId>
-              </a:tblPr>
-              <a:tblGrid>
-                <a:gridCol w="12192000">
-                  <a:extLst>
-                    <a:ext uri="{9D8B030D-6E8A-4147-A177-3AD203B41FA5}">
-                      <a16:colId xmlns:a16="http://schemas.microsoft.com/office/drawing/2014/main" val="20000"/>
-                    </a:ext>
-                  </a:extLst>
-                </a:gridCol>
-              </a:tblGrid>
-              <a:tr h="321276">
-                <a:tc>
-                  <a:txBody>
-                    <a:bodyPr/>
-                    <a:lstStyle/>
-                    <a:p>
-                      <a:r>
-                        <a:rPr lang="ru-RU" dirty="0"/>
-                        <a:t>Основы</a:t>
-                      </a:r>
-                      <a:r>
-                        <a:rPr lang="ru-RU" baseline="0" dirty="0"/>
-                        <a:t> построения файловых систем</a:t>
-                      </a:r>
-                      <a:endParaRPr lang="ru-RU" dirty="0"/>
-                    </a:p>
-                  </a:txBody>
-                  <a:tcPr/>
-                </a:tc>
-                <a:extLst>
-                  <a:ext uri="{0D108BD9-81ED-4DB2-BD59-A6C34878D82A}">
-                    <a16:rowId xmlns:a16="http://schemas.microsoft.com/office/drawing/2014/main" val="10000"/>
-                  </a:ext>
-                </a:extLst>
-              </a:tr>
-            </a:tbl>
-          </a:graphicData>
-        </a:graphic>
-      </p:graphicFrame>
-      <p:graphicFrame>
-        <p:nvGraphicFramePr>
-          <p:cNvPr id="6" name="Table 5"/>
-          <p:cNvGraphicFramePr>
-            <a:graphicFrameLocks noGrp="1"/>
-          </p:cNvGraphicFramePr>
-          <p:nvPr>
-            <p:extLst>
-              <p:ext uri="{D42A27DB-BD31-4B8C-83A1-F6EECF244321}">
-                <p14:modId xmlns:p14="http://schemas.microsoft.com/office/powerpoint/2010/main" val="4164474727"/>
-              </p:ext>
-            </p:extLst>
-          </p:nvPr>
-        </p:nvGraphicFramePr>
-        <p:xfrm>
-          <a:off x="0" y="6532604"/>
-          <a:ext cx="12192000" cy="365760"/>
-        </p:xfrm>
-        <a:graphic>
-          <a:graphicData uri="http://schemas.openxmlformats.org/drawingml/2006/table">
-            <a:tbl>
-              <a:tblPr firstRow="1" bandRow="1">
-                <a:tableStyleId>{5C22544A-7EE6-4342-B048-85BDC9FD1C3A}</a:tableStyleId>
-              </a:tblPr>
-              <a:tblGrid>
-                <a:gridCol w="12192000">
-                  <a:extLst>
-                    <a:ext uri="{9D8B030D-6E8A-4147-A177-3AD203B41FA5}">
-                      <a16:colId xmlns:a16="http://schemas.microsoft.com/office/drawing/2014/main" val="20000"/>
-                    </a:ext>
-                  </a:extLst>
-                </a:gridCol>
-              </a:tblGrid>
-              <a:tr h="308094">
-                <a:tc>
-                  <a:txBody>
-                    <a:bodyPr/>
-                    <a:lstStyle/>
-                    <a:p>
-                      <a:r>
-                        <a:rPr lang="en-US" dirty="0"/>
-                        <a:t>Acronis @ </a:t>
-                      </a:r>
-                      <a:r>
-                        <a:rPr lang="ru-RU" dirty="0"/>
-                        <a:t>МФТИ</a:t>
-                      </a:r>
-                    </a:p>
-                  </a:txBody>
-                  <a:tcPr/>
-                </a:tc>
-                <a:extLst>
-                  <a:ext uri="{0D108BD9-81ED-4DB2-BD59-A6C34878D82A}">
-                    <a16:rowId xmlns:a16="http://schemas.microsoft.com/office/drawing/2014/main" val="10000"/>
-                  </a:ext>
-                </a:extLst>
-              </a:tr>
-            </a:tbl>
-          </a:graphicData>
-        </a:graphic>
-      </p:graphicFrame>
       <p:graphicFrame>
         <p:nvGraphicFramePr>
           <p:cNvPr id="2" name="Table 1"/>
@@ -23804,7 +22976,7 @@
 </p:sld>
 </file>
 
-<file path=ppt/slides/slide23.xml><?xml version="1.0" encoding="utf-8"?>
+<file path=ppt/slides/slide22.xml><?xml version="1.0" encoding="utf-8"?>
 <p:sld xmlns:a="http://schemas.openxmlformats.org/drawingml/2006/main" xmlns:r="http://schemas.openxmlformats.org/officeDocument/2006/relationships" xmlns:p="http://schemas.openxmlformats.org/presentationml/2006/main">
   <p:cSld>
     <p:spTree>

</xml_diff>